<commit_message>
Command line error correction
</commit_message>
<xml_diff>
--- a/Architecture.pptx
+++ b/Architecture.pptx
@@ -108,6 +108,11 @@
       </a:defRPr>
     </a:lvl9pPr>
   </p:defaultTextStyle>
+  <p:extLst>
+    <p:ext uri="{EFAFB233-063F-42B5-8137-9DF3F51BA10A}">
+      <p15:sldGuideLst xmlns:p15="http://schemas.microsoft.com/office/powerpoint/2012/main"/>
+    </p:ext>
+  </p:extLst>
 </p:presentation>
 </file>
 
@@ -233,13 +238,13 @@
   <p:clrMapOvr>
     <a:overrideClrMapping bg1="lt1" tx1="dk1" bg2="lt2" tx2="dk2" accent1="accent1" accent2="accent2" accent3="accent3" accent4="accent4" accent5="accent5" accent6="accent6" hlink="hlink" folHlink="folHlink"/>
   </p:clrMapOvr>
-  <mc:AlternateContent xmlns:mc="http://schemas.openxmlformats.org/markup-compatibility/2006">
-    <mc:Choice xmlns:p14="http://schemas.microsoft.com/office/powerpoint/2010/main" Requires="p14">
+  <mc:AlternateContent xmlns:mc="http://schemas.openxmlformats.org/markup-compatibility/2006" xmlns:p14="http://schemas.microsoft.com/office/powerpoint/2010/main">
+    <mc:Choice Requires="p14">
       <p:transition spd="med" p14:dur="700">
         <p:fade/>
       </p:transition>
     </mc:Choice>
-    <mc:Fallback>
+    <mc:Fallback xmlns="">
       <p:transition spd="med">
         <p:fade/>
       </p:transition>
@@ -2696,13 +2701,13 @@
   <p:clrMapOvr>
     <a:overrideClrMapping bg1="lt1" tx1="dk1" bg2="lt2" tx2="dk2" accent1="accent1" accent2="accent2" accent3="accent3" accent4="accent4" accent5="accent5" accent6="accent6" hlink="hlink" folHlink="folHlink"/>
   </p:clrMapOvr>
-  <mc:AlternateContent xmlns:mc="http://schemas.openxmlformats.org/markup-compatibility/2006">
-    <mc:Choice xmlns:p14="http://schemas.microsoft.com/office/powerpoint/2010/main" Requires="p14">
+  <mc:AlternateContent xmlns:mc="http://schemas.openxmlformats.org/markup-compatibility/2006" xmlns:p14="http://schemas.microsoft.com/office/powerpoint/2010/main">
+    <mc:Choice Requires="p14">
       <p:transition spd="med" p14:dur="700">
         <p:fade/>
       </p:transition>
     </mc:Choice>
-    <mc:Fallback>
+    <mc:Fallback xmlns="">
       <p:transition spd="med">
         <p:fade/>
       </p:transition>
@@ -8930,13 +8935,13 @@
   <p:clrMapOvr>
     <a:overrideClrMapping bg1="dk1" tx1="lt1" bg2="dk2" tx2="lt2" accent1="accent1" accent2="accent2" accent3="accent3" accent4="accent4" accent5="accent5" accent6="accent6" hlink="hlink" folHlink="folHlink"/>
   </p:clrMapOvr>
-  <mc:AlternateContent xmlns:mc="http://schemas.openxmlformats.org/markup-compatibility/2006">
-    <mc:Choice xmlns:p14="http://schemas.microsoft.com/office/powerpoint/2010/main" Requires="p14">
+  <mc:AlternateContent xmlns:mc="http://schemas.openxmlformats.org/markup-compatibility/2006" xmlns:p14="http://schemas.microsoft.com/office/powerpoint/2010/main">
+    <mc:Choice Requires="p14">
       <p:transition spd="med" p14:dur="700">
         <p:fade/>
       </p:transition>
     </mc:Choice>
-    <mc:Fallback>
+    <mc:Fallback xmlns="">
       <p:transition spd="med">
         <p:fade/>
       </p:transition>
@@ -9055,13 +9060,13 @@
   <p:clrMapOvr>
     <a:overrideClrMapping bg1="dk1" tx1="lt1" bg2="dk2" tx2="lt2" accent1="accent1" accent2="accent2" accent3="accent3" accent4="accent4" accent5="accent5" accent6="accent6" hlink="hlink" folHlink="folHlink"/>
   </p:clrMapOvr>
-  <mc:AlternateContent xmlns:mc="http://schemas.openxmlformats.org/markup-compatibility/2006">
-    <mc:Choice xmlns:p14="http://schemas.microsoft.com/office/powerpoint/2010/main" Requires="p14">
+  <mc:AlternateContent xmlns:mc="http://schemas.openxmlformats.org/markup-compatibility/2006" xmlns:p14="http://schemas.microsoft.com/office/powerpoint/2010/main">
+    <mc:Choice Requires="p14">
       <p:transition spd="med" p14:dur="700">
         <p:fade/>
       </p:transition>
     </mc:Choice>
-    <mc:Fallback>
+    <mc:Fallback xmlns="">
       <p:transition spd="med">
         <p:fade/>
       </p:transition>
@@ -9175,13 +9180,13 @@
   <p:clrMapOvr>
     <a:overrideClrMapping bg1="lt1" tx1="dk1" bg2="lt2" tx2="dk2" accent1="accent1" accent2="accent2" accent3="accent3" accent4="accent4" accent5="accent5" accent6="accent6" hlink="hlink" folHlink="folHlink"/>
   </p:clrMapOvr>
-  <mc:AlternateContent xmlns:mc="http://schemas.openxmlformats.org/markup-compatibility/2006">
-    <mc:Choice xmlns:p14="http://schemas.microsoft.com/office/powerpoint/2010/main" Requires="p14">
+  <mc:AlternateContent xmlns:mc="http://schemas.openxmlformats.org/markup-compatibility/2006" xmlns:p14="http://schemas.microsoft.com/office/powerpoint/2010/main">
+    <mc:Choice Requires="p14">
       <p:transition spd="med" p14:dur="700">
         <p:fade/>
       </p:transition>
     </mc:Choice>
-    <mc:Fallback>
+    <mc:Fallback xmlns="">
       <p:transition spd="med">
         <p:fade/>
       </p:transition>
@@ -10219,7 +10224,7 @@
                 <a:tabLst/>
                 <a:defRPr/>
               </a:pPr>
-              <a:t>10/27/2020</a:t>
+              <a:t>12/7/2020</a:t>
             </a:fld>
             <a:endParaRPr kumimoji="0" lang="en-US" sz="1765" b="0" i="0" u="none" strike="noStrike" kern="1200" cap="none" spc="0" normalizeH="0" baseline="0" noProof="0">
               <a:ln>
@@ -31141,7 +31146,7 @@
               <a:defRPr/>
             </a:pPr>
             <a:r>
-              <a:rPr kumimoji="1" lang="en-US" altLang="ja-JP" sz="1200" b="0" i="0" u="none" strike="noStrike" kern="1200" cap="none" spc="0" normalizeH="0" baseline="0" noProof="0">
+              <a:rPr kumimoji="1" lang="en-US" altLang="ja-JP" sz="1200" b="0" i="0" u="none" strike="noStrike" kern="1200" cap="none" spc="0" normalizeH="0" baseline="0" noProof="0" dirty="0">
                 <a:ln>
                   <a:noFill/>
                 </a:ln>
@@ -31177,7 +31182,7 @@
               <a:defRPr/>
             </a:pPr>
             <a:r>
-              <a:rPr kumimoji="1" lang="en-US" altLang="ja-JP" sz="1200" b="0" i="0" u="none" strike="noStrike" kern="1200" cap="none" spc="0" normalizeH="0" baseline="0" noProof="0">
+              <a:rPr kumimoji="1" lang="en-US" altLang="ja-JP" sz="1200" b="0" i="0" u="none" strike="noStrike" kern="1200" cap="none" spc="0" normalizeH="0" baseline="0" noProof="0" dirty="0">
                 <a:ln>
                   <a:noFill/>
                 </a:ln>
@@ -31193,7 +31198,7 @@
               </a:rPr>
               <a:t>Endpoint</a:t>
             </a:r>
-            <a:endParaRPr kumimoji="1" lang="ja-JP" altLang="en-US" sz="1200" b="0" i="0" u="none" strike="noStrike" kern="1200" cap="none" spc="0" normalizeH="0" baseline="0" noProof="0">
+            <a:endParaRPr kumimoji="1" lang="ja-JP" altLang="en-US" sz="1200" b="0" i="0" u="none" strike="noStrike" kern="1200" cap="none" spc="0" normalizeH="0" baseline="0" noProof="0" dirty="0">
               <a:ln>
                 <a:noFill/>
               </a:ln>

</xml_diff>